<commit_message>
edit lai file pptx do loi font chu
</commit_message>
<xml_diff>
--- a/BaoCao/ThuyetTrinh.pptx
+++ b/BaoCao/ThuyetTrinh.pptx
@@ -218,7 +218,7 @@
           <a:p>
             <a:fld id="{459A14EE-1397-4E5B-9BB0-BBC87119A1E9}" type="datetimeFigureOut">
               <a:rPr lang="en-US" smtClean="0"/>
-              <a:t>6/9/20</a:t>
+              <a:t>9/6/2020</a:t>
             </a:fld>
             <a:endParaRPr lang="en-US"/>
           </a:p>
@@ -711,7 +711,7 @@
           <a:p>
             <a:fld id="{49AEB9B4-C508-43E2-BA5D-B0C9D0C8EE40}" type="datetime1">
               <a:rPr lang="en-US" smtClean="0"/>
-              <a:t>6/9/20</a:t>
+              <a:t>9/6/2020</a:t>
             </a:fld>
             <a:endParaRPr lang="en-US"/>
           </a:p>
@@ -919,7 +919,7 @@
           <a:p>
             <a:fld id="{60AA9645-C54E-411E-976A-AB76603FCF3D}" type="datetime1">
               <a:rPr lang="en-US" smtClean="0"/>
-              <a:t>6/9/20</a:t>
+              <a:t>9/6/2020</a:t>
             </a:fld>
             <a:endParaRPr lang="en-US"/>
           </a:p>
@@ -1175,7 +1175,7 @@
           <a:p>
             <a:fld id="{CA2A0516-9E53-4F85-9267-1A4997C5D8BE}" type="datetime1">
               <a:rPr lang="en-US" smtClean="0"/>
-              <a:t>6/9/20</a:t>
+              <a:t>9/6/2020</a:t>
             </a:fld>
             <a:endParaRPr lang="en-US"/>
           </a:p>
@@ -1345,7 +1345,7 @@
           <a:p>
             <a:fld id="{F827EA5F-C336-440A-80D5-372806C70662}" type="datetime1">
               <a:rPr lang="en-US" smtClean="0"/>
-              <a:t>6/9/20</a:t>
+              <a:t>9/6/2020</a:t>
             </a:fld>
             <a:endParaRPr lang="en-US"/>
           </a:p>
@@ -1688,7 +1688,7 @@
           <a:p>
             <a:fld id="{384687B6-7530-4AB8-B9A8-86983DE1B9A0}" type="datetime1">
               <a:rPr lang="en-US" smtClean="0"/>
-              <a:t>6/9/20</a:t>
+              <a:t>9/6/2020</a:t>
             </a:fld>
             <a:endParaRPr lang="en-US"/>
           </a:p>
@@ -1963,7 +1963,7 @@
           <a:p>
             <a:fld id="{7DD88D8C-78FB-4A5E-9619-79F4B6DDA891}" type="datetime1">
               <a:rPr lang="en-US" smtClean="0"/>
-              <a:t>6/9/20</a:t>
+              <a:t>9/6/2020</a:t>
             </a:fld>
             <a:endParaRPr lang="en-US"/>
           </a:p>
@@ -2342,7 +2342,7 @@
           <a:p>
             <a:fld id="{9A2C7C13-746B-406F-B7D8-547CF082420B}" type="datetime1">
               <a:rPr lang="en-US" smtClean="0"/>
-              <a:t>6/9/20</a:t>
+              <a:t>9/6/2020</a:t>
             </a:fld>
             <a:endParaRPr lang="en-US"/>
           </a:p>
@@ -2460,7 +2460,7 @@
           <a:p>
             <a:fld id="{5CDEA9B6-565C-4593-8221-510CB162C7AB}" type="datetime1">
               <a:rPr lang="en-US" smtClean="0"/>
-              <a:t>6/9/20</a:t>
+              <a:t>9/6/2020</a:t>
             </a:fld>
             <a:endParaRPr lang="en-US"/>
           </a:p>
@@ -2631,7 +2631,7 @@
           <a:p>
             <a:fld id="{C4558360-81A1-4669-A89D-8C853A2EC2B7}" type="datetime1">
               <a:rPr lang="en-US" smtClean="0"/>
-              <a:t>6/9/20</a:t>
+              <a:t>9/6/2020</a:t>
             </a:fld>
             <a:endParaRPr lang="en-US"/>
           </a:p>
@@ -2985,7 +2985,7 @@
           <a:p>
             <a:fld id="{0EC7C9B4-8854-4E94-8B37-C50BC5EEA735}" type="datetime1">
               <a:rPr lang="en-US" smtClean="0"/>
-              <a:t>6/9/20</a:t>
+              <a:t>9/6/2020</a:t>
             </a:fld>
             <a:endParaRPr lang="en-US"/>
           </a:p>
@@ -3362,7 +3362,7 @@
           <a:p>
             <a:fld id="{6457F759-BB3C-4476-9B90-15EC2EC843AE}" type="datetime1">
               <a:rPr lang="en-US" smtClean="0"/>
-              <a:t>6/9/20</a:t>
+              <a:t>9/6/2020</a:t>
             </a:fld>
             <a:endParaRPr lang="en-US"/>
           </a:p>
@@ -3649,7 +3649,7 @@
           <a:p>
             <a:fld id="{58329DA5-3C96-43C7-A08F-F4EB165EF0A0}" type="datetime1">
               <a:rPr lang="en-US" smtClean="0"/>
-              <a:t>6/9/20</a:t>
+              <a:t>9/6/2020</a:t>
             </a:fld>
             <a:endParaRPr lang="en-US"/>
           </a:p>
@@ -4192,26 +4192,26 @@
         </p:spPr>
         <p:txBody>
           <a:bodyPr>
-            <a:normAutofit/>
+            <a:noAutofit/>
           </a:bodyPr>
           <a:lstStyle/>
           <a:p>
             <a:pPr algn="ctr"/>
             <a:r>
+              <a:rPr lang="en-US" sz="4000" b="1" dirty="0">
+                <a:latin typeface="Segoe UI" panose="020B0502040204020203" pitchFamily="34" charset="0"/>
+                <a:cs typeface="Segoe UI" panose="020B0502040204020203" pitchFamily="34" charset="0"/>
+              </a:rPr>
+              <a:t>ĐỒ ÁN MÔN HỌC</a:t>
+            </a:r>
+            <a:br>
               <a:rPr lang="en-US" sz="5400" b="1" dirty="0">
                 <a:latin typeface="Segoe UI" panose="020B0502040204020203" pitchFamily="34" charset="0"/>
                 <a:cs typeface="Segoe UI" panose="020B0502040204020203" pitchFamily="34" charset="0"/>
               </a:rPr>
-              <a:t>ĐỒ ÁN MÔN HỌC</a:t>
-            </a:r>
-            <a:br>
-              <a:rPr lang="en-US" sz="7200" b="1" dirty="0">
-                <a:latin typeface="Segoe UI" panose="020B0502040204020203" pitchFamily="34" charset="0"/>
-                <a:cs typeface="Segoe UI" panose="020B0502040204020203" pitchFamily="34" charset="0"/>
-              </a:rPr>
             </a:br>
             <a:r>
-              <a:rPr lang="en-US" sz="4400" b="1" dirty="0">
+              <a:rPr lang="en-US" sz="3200" b="1" dirty="0">
                 <a:latin typeface="Segoe UI" panose="020B0502040204020203" pitchFamily="34" charset="0"/>
                 <a:cs typeface="Segoe UI" panose="020B0502040204020203" pitchFamily="34" charset="0"/>
               </a:rPr>
@@ -4512,7 +4512,7 @@
         </p:spPr>
         <p:txBody>
           <a:bodyPr vert="horz" lIns="91440" tIns="45720" rIns="91440" bIns="45720" rtlCol="0">
-            <a:normAutofit fontScale="77500" lnSpcReduction="20000"/>
+            <a:noAutofit/>
           </a:bodyPr>
           <a:lstStyle>
             <a:lvl1pPr marL="0" indent="0" algn="l" defTabSz="914400" rtl="0" eaLnBrk="1" latinLnBrk="0" hangingPunct="1">
@@ -4760,13 +4760,13 @@
           <a:p>
             <a:pPr algn="r"/>
             <a:r>
-              <a:rPr lang="vi-VN" sz="2000" b="1" dirty="0">
+              <a:rPr lang="vi-VN" sz="1400" b="1" dirty="0">
                 <a:latin typeface="Segoe UI" panose="020B0502040204020203" pitchFamily="34" charset="0"/>
                 <a:cs typeface="Segoe UI" panose="020B0502040204020203" pitchFamily="34" charset="0"/>
               </a:rPr>
               <a:t>GVHD:Nguyễn hồ minh đức</a:t>
             </a:r>
-            <a:endParaRPr lang="en-US" sz="2000" b="1" dirty="0">
+            <a:endParaRPr lang="en-US" sz="1400" b="1" dirty="0">
               <a:latin typeface="Segoe UI" panose="020B0502040204020203" pitchFamily="34" charset="0"/>
               <a:cs typeface="Segoe UI" panose="020B0502040204020203" pitchFamily="34" charset="0"/>
             </a:endParaRPr>
@@ -4798,7 +4798,7 @@
         </p:spPr>
         <p:txBody>
           <a:bodyPr vert="horz" lIns="91440" tIns="45720" rIns="91440" bIns="45720" rtlCol="0" anchor="b">
-            <a:normAutofit/>
+            <a:noAutofit/>
           </a:bodyPr>
           <a:lstStyle>
             <a:lvl1pPr algn="l" defTabSz="914400" rtl="0" eaLnBrk="1" latinLnBrk="0" hangingPunct="1">
@@ -4825,7 +4825,7 @@
           <a:p>
             <a:pPr algn="ctr"/>
             <a:r>
-              <a:rPr lang="en-US" sz="4400" b="1" dirty="0">
+              <a:rPr lang="en-US" sz="3600" b="1" dirty="0">
                 <a:solidFill>
                   <a:srgbClr val="0070C0"/>
                 </a:solidFill>
@@ -7947,7 +7947,21 @@
                 <a:latin typeface="Segoe UI" panose="020B0502040204020203" pitchFamily="34" charset="0"/>
                 <a:cs typeface="Segoe UI" panose="020B0502040204020203" pitchFamily="34" charset="0"/>
               </a:rPr>
-              <a:t>CÁM ƠN THẦY VÀ CÁC BẠN ĐÃ CHÚ Ý LẮNG NGHE</a:t>
+              <a:t>CÁM ƠN THẦY VÀ CÁC BẠN </a:t>
+            </a:r>
+            <a:r>
+              <a:rPr lang="vi-VN" sz="7200" b="1">
+                <a:latin typeface="Segoe UI" panose="020B0502040204020203" pitchFamily="34" charset="0"/>
+                <a:cs typeface="Segoe UI" panose="020B0502040204020203" pitchFamily="34" charset="0"/>
+              </a:rPr>
+              <a:t>ĐÃ </a:t>
+            </a:r>
+            <a:r>
+              <a:rPr lang="en-US" sz="7200" b="1">
+                <a:latin typeface="Segoe UI" panose="020B0502040204020203" pitchFamily="34" charset="0"/>
+                <a:cs typeface="Segoe UI" panose="020B0502040204020203" pitchFamily="34" charset="0"/>
+              </a:rPr>
+              <a:t>THEO DÕI &lt;3</a:t>
             </a:r>
             <a:endParaRPr lang="en-US" sz="7200" b="1" dirty="0">
               <a:latin typeface="Segoe UI" panose="020B0502040204020203" pitchFamily="34" charset="0"/>

</xml_diff>